<commit_message>
Correct typo overwrite -> override
</commit_message>
<xml_diff>
--- a/Docs/LVOOP_vip2012.pptx
+++ b/Docs/LVOOP_vip2012.pptx
@@ -209,7 +209,7 @@
             <a:fld id="{6F14095A-A8C5-4CE7-AD6F-21E3B5E2557D}" type="datetimeFigureOut">
               <a:rPr lang="de-DE" smtClean="0"/>
               <a:pPr/>
-              <a:t>08.10.2012</a:t>
+              <a:t>28.05.2013</a:t>
             </a:fld>
             <a:endParaRPr lang="de-DE"/>
           </a:p>
@@ -3473,12 +3473,16 @@
               <a:t>Abhängig von der Klasse des Objekts im Draht wird das richtige </a:t>
             </a:r>
             <a:r>
-              <a:rPr lang="de-DE" sz="1800" dirty="0" err="1"/>
-              <a:t>Overwrite</a:t>
+              <a:rPr lang="de-DE" sz="1800" dirty="0" err="1" smtClean="0"/>
+              <a:t>Override</a:t>
+            </a:r>
+            <a:r>
+              <a:rPr lang="de-DE" sz="1800" dirty="0" smtClean="0"/>
+              <a:t>-VI </a:t>
             </a:r>
             <a:r>
               <a:rPr lang="de-DE" sz="1800" dirty="0"/>
-              <a:t>-VI aufgerufen.</a:t>
+              <a:t>aufgerufen.</a:t>
             </a:r>
           </a:p>
           <a:p>
@@ -5272,7 +5276,7 @@
         <p:spPr>
           <a:xfrm>
             <a:off x="5580112" y="4653136"/>
-            <a:ext cx="3531736" cy="369332"/>
+            <a:ext cx="3429144" cy="369332"/>
           </a:xfrm>
           <a:prstGeom prst="rect">
             <a:avLst/>
@@ -5302,8 +5306,12 @@
               <a:t>, </a:t>
             </a:r>
             <a:r>
+              <a:rPr lang="de-DE" i="1" dirty="0" err="1"/>
+              <a:t>o</a:t>
+            </a:r>
+            <a:r>
               <a:rPr lang="de-DE" i="1" dirty="0" err="1" smtClean="0"/>
-              <a:t>overwrite</a:t>
+              <a:t>verride</a:t>
             </a:r>
             <a:r>
               <a:rPr lang="de-DE" dirty="0" smtClean="0"/>

</xml_diff>